<commit_message>
update based upon discussion with AL, AM and MS
git-svn-id: file://localhost/tmp/svn2git/svn@5000 defb5e50-622e-49ec-a68e-d72c7db87b45
</commit_message>
<xml_diff>
--- a/saga-talks/saga-magic.pptx
+++ b/saga-talks/saga-magic.pptx
@@ -6310,11 +6310,7 @@
           <a:p>
             <a:r>
               <a:rPr lang="en-US" sz="2400" dirty="0" smtClean="0"/>
-              <a:t>Shantenu Jha,</a:t>
-            </a:r>
-            <a:r>
-              <a:rPr lang="en-US" sz="2400" dirty="0" smtClean="0"/>
-              <a:t> A </a:t>
+              <a:t>Shantenu Jha, A </a:t>
             </a:r>
             <a:r>
               <a:rPr lang="en-US" sz="2400" dirty="0" err="1" smtClean="0"/>
@@ -6344,15 +6340,7 @@
                   <a:srgbClr val="800000"/>
                 </a:solidFill>
               </a:rPr>
-              <a:t>http</a:t>
-            </a:r>
-            <a:r>
-              <a:rPr lang="en-US" sz="2100" dirty="0" smtClean="0">
-                <a:solidFill>
-                  <a:srgbClr val="800000"/>
-                </a:solidFill>
-              </a:rPr>
-              <a:t>://</a:t>
+              <a:t>http://</a:t>
             </a:r>
             <a:r>
               <a:rPr lang="en-US" sz="2100" dirty="0" err="1" smtClean="0">
@@ -6380,7 +6368,6 @@
               <a:rPr lang="en-US" sz="2100" dirty="0" smtClean="0"/>
               <a:t>MAGIC Meeting, 06 July 2011</a:t>
             </a:r>
-            <a:endParaRPr lang="en-US" sz="2100" dirty="0" smtClean="0"/>
           </a:p>
         </p:txBody>
       </p:sp>
@@ -6408,11 +6395,7 @@
           <a:p>
             <a:r>
               <a:rPr lang="en-US" sz="2800" dirty="0" smtClean="0"/>
-              <a:t>The Current State of Grid Computing: The SAGA </a:t>
-            </a:r>
-            <a:r>
-              <a:rPr lang="en-US" sz="2800" dirty="0" smtClean="0"/>
-              <a:t>Worldview</a:t>
+              <a:t>The Current State of Grid Computing: The SAGA Worldview</a:t>
             </a:r>
             <a:endParaRPr lang="en-US" sz="2800" dirty="0"/>
           </a:p>
@@ -6745,7 +6728,7 @@
         </p:spPr>
         <p:txBody>
           <a:bodyPr>
-            <a:normAutofit lnSpcReduction="10000"/>
+            <a:normAutofit fontScale="92500" lnSpcReduction="20000"/>
           </a:bodyPr>
           <a:lstStyle/>
           <a:p>
@@ -6759,12 +6742,17 @@
               <a:rPr lang="en-US" dirty="0" smtClean="0"/>
               <a:t>Individual Grid technologies: </a:t>
             </a:r>
+            <a:endParaRPr lang="en-US" dirty="0" smtClean="0"/>
           </a:p>
           <a:p>
             <a:pPr lvl="1"/>
             <a:r>
               <a:rPr lang="en-US" dirty="0" smtClean="0"/>
-              <a:t>Maturing, strengthening, seeing uptake</a:t>
+              <a:t>Mostly maturing</a:t>
+            </a:r>
+            <a:r>
+              <a:rPr lang="en-US" dirty="0" smtClean="0"/>
+              <a:t>, strengthening, seeing uptake</a:t>
             </a:r>
           </a:p>
           <a:p>
@@ -6773,24 +6761,79 @@
               <a:rPr lang="en-US" dirty="0" smtClean="0"/>
               <a:t>Many grid technologies are to be found in cloud space</a:t>
             </a:r>
+            <a:endParaRPr lang="en-US" dirty="0" smtClean="0"/>
           </a:p>
           <a:p>
             <a:pPr lvl="1"/>
             <a:r>
               <a:rPr lang="en-US" dirty="0" smtClean="0"/>
-              <a:t>Time-scales are consistent with academic/research </a:t>
-            </a:r>
-          </a:p>
-          <a:p>
+              <a:t>Federation </a:t>
+            </a:r>
             <a:r>
               <a:rPr lang="en-US" dirty="0" smtClean="0"/>
-              <a:t>Most PGI don’t work as GI, except for the determined/elite few!</a:t>
-            </a:r>
-          </a:p>
-          <a:p>
+              <a:t>does not have to be difficult, but is</a:t>
+            </a:r>
             <a:r>
               <a:rPr lang="en-US" dirty="0" smtClean="0"/>
-              <a:t>Applications:</a:t>
+              <a:t> due to tech &amp; policy</a:t>
+            </a:r>
+          </a:p>
+          <a:p>
+            <a:pPr lvl="2"/>
+            <a:r>
+              <a:rPr lang="en-US" dirty="0" smtClean="0"/>
+              <a:t>e.g. </a:t>
+            </a:r>
+            <a:r>
+              <a:rPr lang="en-US" dirty="0" smtClean="0"/>
+              <a:t>security, underlying policy behind security token</a:t>
+            </a:r>
+          </a:p>
+          <a:p>
+            <a:r>
+              <a:rPr lang="en-US" dirty="0" smtClean="0"/>
+              <a:t>Most </a:t>
+            </a:r>
+            <a:r>
+              <a:rPr lang="en-US" dirty="0" smtClean="0"/>
+              <a:t>PGI don’t work as GI, except for the determined/elite few</a:t>
+            </a:r>
+            <a:r>
+              <a:rPr lang="en-US" dirty="0" smtClean="0"/>
+              <a:t>! </a:t>
+            </a:r>
+            <a:r>
+              <a:rPr lang="en-US" dirty="0" smtClean="0"/>
+              <a:t> </a:t>
+            </a:r>
+          </a:p>
+          <a:p>
+            <a:pPr lvl="1"/>
+            <a:r>
+              <a:rPr lang="en-US" dirty="0" smtClean="0"/>
+              <a:t>Narrow Grids versus general-purpose grids </a:t>
+            </a:r>
+            <a:r>
+              <a:rPr lang="en-US" sz="1730" i="1" dirty="0" smtClean="0"/>
+              <a:t>[see Jha, </a:t>
+            </a:r>
+            <a:r>
+              <a:rPr lang="en-US" sz="1730" i="1" dirty="0" err="1" smtClean="0"/>
+              <a:t>Merzky</a:t>
+            </a:r>
+            <a:r>
+              <a:rPr lang="en-US" sz="1730" i="1" dirty="0" smtClean="0"/>
+              <a:t>, Fox et al]</a:t>
+            </a:r>
+          </a:p>
+          <a:p>
+            <a:r>
+              <a:rPr lang="en-US" dirty="0" smtClean="0"/>
+              <a:t>Applications</a:t>
+            </a:r>
+            <a:r>
+              <a:rPr lang="en-US" dirty="0" smtClean="0"/>
+              <a:t>:</a:t>
             </a:r>
           </a:p>
           <a:p>
@@ -6882,56 +6925,91 @@
           <a:lstStyle/>
           <a:p>
             <a:r>
-              <a:rPr lang="en-US" b="1" dirty="0" smtClean="0"/>
-              <a:t>Integrated end-to-end solutions from applications down onwards to the lower reaches of middleware</a:t>
+              <a:rPr lang="en-US" dirty="0" smtClean="0"/>
+              <a:t>Integrated end-to-end </a:t>
+            </a:r>
+            <a:r>
+              <a:rPr lang="en-US" dirty="0" smtClean="0"/>
+              <a:t>solutions</a:t>
+            </a:r>
+            <a:r>
+              <a:rPr lang="en-US" dirty="0" smtClean="0"/>
+              <a:t>: </a:t>
+            </a:r>
+            <a:r>
+              <a:rPr lang="en-US" dirty="0" smtClean="0"/>
+              <a:t>Applications </a:t>
+            </a:r>
+            <a:r>
+              <a:rPr lang="en-US" dirty="0" smtClean="0"/>
+              <a:t>down onwards to the lower reaches of middleware</a:t>
             </a:r>
           </a:p>
           <a:p>
             <a:pPr lvl="1"/>
             <a:r>
               <a:rPr lang="en-US" dirty="0" smtClean="0"/>
-              <a:t>There exist many moving parts and degrees-of-</a:t>
-            </a:r>
+              <a:t>There exist many moving parts and degrees-of-freedom</a:t>
+            </a:r>
+          </a:p>
+          <a:p>
+            <a:pPr lvl="2"/>
             <a:r>
               <a:rPr lang="en-US" dirty="0" smtClean="0"/>
-              <a:t>freedom</a:t>
+              <a:t>Individual components exist, but not integrated within</a:t>
+            </a:r>
+            <a:r>
+              <a:rPr lang="en-US" dirty="0" smtClean="0"/>
+              <a:t>  </a:t>
+            </a:r>
+            <a:r>
+              <a:rPr lang="en-US" dirty="0" smtClean="0"/>
+              <a:t>consistent </a:t>
+            </a:r>
+            <a:r>
+              <a:rPr lang="en-US" dirty="0" smtClean="0"/>
+              <a:t>architectures</a:t>
             </a:r>
           </a:p>
           <a:p>
             <a:pPr lvl="2"/>
             <a:r>
               <a:rPr lang="en-US" dirty="0" smtClean="0"/>
-              <a:t>Individual components exist, but not integrated within a consistent architecture</a:t>
-            </a:r>
+              <a:t>Multiple point-solutions but very few end-to-end solutions</a:t>
+            </a:r>
+            <a:endParaRPr lang="en-US" dirty="0" smtClean="0"/>
           </a:p>
           <a:p>
             <a:pPr lvl="1"/>
             <a:r>
               <a:rPr lang="en-US" dirty="0" smtClean="0"/>
-              <a:t>Most PGI effort: Individual software, not application capabilities</a:t>
-            </a:r>
-          </a:p>
-          <a:p>
-            <a:pPr lvl="2"/>
-            <a:endParaRPr lang="en-US" dirty="0" smtClean="0"/>
+              <a:t>Most PGI effort: Individual software, not application </a:t>
+            </a:r>
+            <a:r>
+              <a:rPr lang="en-US" dirty="0" smtClean="0"/>
+              <a:t>capabilities</a:t>
+            </a:r>
+          </a:p>
+          <a:p>
+            <a:r>
+              <a:rPr lang="en-US" dirty="0" smtClean="0"/>
+              <a:t>Research Questions that are engendered?</a:t>
+            </a:r>
+          </a:p>
+          <a:p>
+            <a:pPr lvl="1"/>
+            <a:r>
+              <a:rPr lang="en-US" dirty="0" smtClean="0"/>
+              <a:t>How do we integrate disparate &amp; diverse </a:t>
+            </a:r>
+            <a:r>
+              <a:rPr lang="en-US" dirty="0" smtClean="0"/>
+              <a:t>software across levels?</a:t>
+            </a:r>
           </a:p>
           <a:p>
             <a:pPr lvl="1"/>
             <a:endParaRPr lang="en-US" dirty="0" smtClean="0"/>
-          </a:p>
-          <a:p>
-            <a:pPr lvl="2"/>
-            <a:endParaRPr lang="en-US" dirty="0" smtClean="0"/>
-          </a:p>
-          <a:p>
-            <a:pPr lvl="2">
-              <a:buNone/>
-            </a:pPr>
-            <a:r>
-              <a:rPr lang="en-US" dirty="0" smtClean="0"/>
-              <a:t> </a:t>
-            </a:r>
-            <a:endParaRPr lang="en-US" dirty="0"/>
           </a:p>
         </p:txBody>
       </p:sp>
@@ -7000,15 +7078,7 @@
           <a:p>
             <a:r>
               <a:rPr lang="en-US" dirty="0" smtClean="0"/>
-              <a:t>Broadly </a:t>
-            </a:r>
-            <a:r>
-              <a:rPr lang="en-US" dirty="0" smtClean="0"/>
-              <a:t>and Deeply Integrated </a:t>
-            </a:r>
-            <a:r>
-              <a:rPr lang="en-US" dirty="0" smtClean="0"/>
-              <a:t>Middleware</a:t>
+              <a:t>Broadly and Deeply Integrated Middleware</a:t>
             </a:r>
           </a:p>
           <a:p>
@@ -7022,11 +7092,7 @@
             <a:pPr lvl="1"/>
             <a:r>
               <a:rPr lang="en-US" dirty="0" smtClean="0"/>
-              <a:t>Upper-level integration between application and </a:t>
-            </a:r>
-            <a:r>
-              <a:rPr lang="en-US" dirty="0" smtClean="0"/>
-              <a:t>middleware</a:t>
+              <a:t>Upper-level integration between application and middleware</a:t>
             </a:r>
           </a:p>
           <a:p>

</xml_diff>

<commit_message>
more changes from discussion..
git-svn-id: file://localhost/tmp/svn2git/svn@5002 defb5e50-622e-49ec-a68e-d72c7db87b45
</commit_message>
<xml_diff>
--- a/saga-talks/saga-magic.pptx
+++ b/saga-talks/saga-magic.pptx
@@ -7078,20 +7078,22 @@
         </p:nvSpPr>
         <p:spPr/>
         <p:txBody>
-          <a:bodyPr/>
+          <a:bodyPr>
+            <a:normAutofit/>
+          </a:bodyPr>
           <a:lstStyle/>
           <a:p>
             <a:r>
               <a:rPr lang="en-US" dirty="0" smtClean="0"/>
-              <a:t>The need for Broadly </a:t>
+              <a:t>The need for broadly </a:t>
             </a:r>
             <a:r>
               <a:rPr lang="en-US" dirty="0" smtClean="0"/>
-              <a:t>and Deeply Integrated </a:t>
+              <a:t>and</a:t>
             </a:r>
             <a:r>
               <a:rPr lang="en-US" dirty="0" smtClean="0"/>
-              <a:t>Middleware</a:t>
+              <a:t> deeply Integrated capabilities</a:t>
             </a:r>
           </a:p>
           <a:p>
@@ -7105,7 +7107,23 @@
             <a:pPr lvl="2"/>
             <a:r>
               <a:rPr lang="en-US" dirty="0" smtClean="0"/>
-              <a:t>Integrated capabilities for applications</a:t>
+              <a:t>Integrated end-to-end solutio</a:t>
+            </a:r>
+            <a:r>
+              <a:rPr lang="en-US" dirty="0" smtClean="0"/>
+              <a:t>n</a:t>
+            </a:r>
+            <a:r>
+              <a:rPr lang="en-US" dirty="0" smtClean="0"/>
+              <a:t> for applications requires transparent federation of  capabilities </a:t>
+            </a:r>
+            <a:r>
+              <a:rPr lang="en-US" smtClean="0"/>
+              <a:t>and the interoperability </a:t>
+            </a:r>
+            <a:r>
+              <a:rPr lang="en-US" dirty="0" smtClean="0"/>
+              <a:t>of services</a:t>
             </a:r>
           </a:p>
           <a:p>

</xml_diff>

<commit_message>
for AM, AL and MS
git-svn-id: file://localhost/tmp/svn2git/svn@5003 defb5e50-622e-49ec-a68e-d72c7db87b45
</commit_message>
<xml_diff>
--- a/saga-talks/saga-magic.pptx
+++ b/saga-talks/saga-magic.pptx
@@ -7115,15 +7115,7 @@
             </a:r>
             <a:r>
               <a:rPr lang="en-US" dirty="0" smtClean="0"/>
-              <a:t> for applications requires transparent federation of  capabilities </a:t>
-            </a:r>
-            <a:r>
-              <a:rPr lang="en-US" smtClean="0"/>
-              <a:t>and the interoperability </a:t>
-            </a:r>
-            <a:r>
-              <a:rPr lang="en-US" dirty="0" smtClean="0"/>
-              <a:t>of services</a:t>
+              <a:t> for applications requires transparent federation of  capabilities and the interoperability of services</a:t>
             </a:r>
           </a:p>
           <a:p>
@@ -7158,7 +7150,19 @@
             <a:pPr lvl="1"/>
             <a:r>
               <a:rPr lang="en-US" dirty="0" smtClean="0"/>
-              <a:t>Test-beds exist out there but need to support effort to use test-beds to transition from experimental to production-grade. </a:t>
+              <a:t>Test-beds exist out there but need to support</a:t>
+            </a:r>
+            <a:r>
+              <a:rPr lang="en-US" dirty="0" smtClean="0"/>
+              <a:t> end-to</a:t>
+            </a:r>
+            <a:r>
+              <a:rPr lang="en-US" smtClean="0"/>
+              <a:t>-end effort </a:t>
+            </a:r>
+            <a:r>
+              <a:rPr lang="en-US" dirty="0" smtClean="0"/>
+              <a:t>to use test-beds to transition from experimental to production-grade. </a:t>
             </a:r>
           </a:p>
           <a:p>

</xml_diff>

<commit_message>
Final version sent to NSF/DoE
git-svn-id: file://localhost/tmp/svn2git/svn@5006 defb5e50-622e-49ec-a68e-d72c7db87b45
</commit_message>
<xml_diff>
--- a/saga-talks/saga-magic.pptx
+++ b/saga-talks/saga-magic.pptx
@@ -6330,20 +6330,21 @@
             </a:r>
             <a:r>
               <a:rPr lang="en-US" dirty="0" smtClean="0"/>
-              <a:t> M </a:t>
+              <a:t>  M </a:t>
             </a:r>
             <a:r>
               <a:rPr lang="en-US" dirty="0" err="1" smtClean="0"/>
-              <a:t>Santcross</a:t>
-            </a:r>
-            <a:r>
-              <a:rPr lang="en-US" dirty="0" smtClean="0"/>
-              <a:t>, O </a:t>
-            </a:r>
-            <a:r>
-              <a:rPr lang="en-US" dirty="0" smtClean="0"/>
-              <a:t>Weidner </a:t>
-            </a:r>
+              <a:t>Santcroos</a:t>
+            </a:r>
+            <a:r>
+              <a:rPr lang="en-US" dirty="0" smtClean="0"/>
+              <a:t>, O Weidner</a:t>
+            </a:r>
+            <a:endParaRPr lang="en-US" sz="2100" dirty="0" smtClean="0">
+              <a:solidFill>
+                <a:srgbClr val="800000"/>
+              </a:solidFill>
+            </a:endParaRPr>
           </a:p>
           <a:p>
             <a:r>
@@ -6352,7 +6353,15 @@
                   <a:srgbClr val="800000"/>
                 </a:solidFill>
               </a:rPr>
-              <a:t>http://</a:t>
+              <a:t>http</a:t>
+            </a:r>
+            <a:r>
+              <a:rPr lang="en-US" sz="2100" dirty="0" smtClean="0">
+                <a:solidFill>
+                  <a:srgbClr val="800000"/>
+                </a:solidFill>
+              </a:rPr>
+              <a:t>://</a:t>
             </a:r>
             <a:r>
               <a:rPr lang="en-US" sz="2100" dirty="0" err="1" smtClean="0">
@@ -6746,7 +6755,23 @@
           <a:p>
             <a:r>
               <a:rPr lang="en-US" dirty="0" smtClean="0"/>
-              <a:t>Separate grid technologies from production grid infrastructure (PGI) from grid/distributed applications</a:t>
+              <a:t>Separate grid </a:t>
+            </a:r>
+            <a:r>
+              <a:rPr lang="en-US" dirty="0" smtClean="0"/>
+              <a:t>technologies, from </a:t>
+            </a:r>
+            <a:r>
+              <a:rPr lang="en-US" dirty="0" smtClean="0"/>
+              <a:t>production grid infrastructure (PGI</a:t>
+            </a:r>
+            <a:r>
+              <a:rPr lang="en-US" dirty="0" smtClean="0"/>
+              <a:t>), from </a:t>
+            </a:r>
+            <a:r>
+              <a:rPr lang="en-US" dirty="0" smtClean="0"/>
+              <a:t>grid/distributed applications</a:t>
             </a:r>
           </a:p>
           <a:p>
@@ -6754,85 +6779,102 @@
               <a:rPr lang="en-US" dirty="0" smtClean="0"/>
               <a:t>Individual Grid technologies: </a:t>
             </a:r>
+          </a:p>
+          <a:p>
+            <a:pPr lvl="1"/>
+            <a:r>
+              <a:rPr lang="en-US" dirty="0" smtClean="0"/>
+              <a:t>Mostly maturing, strengthening, seeing uptake</a:t>
+            </a:r>
+          </a:p>
+          <a:p>
+            <a:pPr lvl="2"/>
+            <a:r>
+              <a:rPr lang="en-US" dirty="0" smtClean="0"/>
+              <a:t>e.g., Many grid technologies are to be found in cloud space</a:t>
+            </a:r>
+          </a:p>
+          <a:p>
+            <a:pPr lvl="1"/>
+            <a:r>
+              <a:rPr lang="en-US" dirty="0" smtClean="0"/>
+              <a:t>Federation does not have to be difficult, but is due to tech &amp; policy</a:t>
+            </a:r>
+          </a:p>
+          <a:p>
+            <a:pPr lvl="2"/>
+            <a:r>
+              <a:rPr lang="en-US" dirty="0" smtClean="0"/>
+              <a:t>e.g., security, underlying policy behind security token</a:t>
+            </a:r>
+          </a:p>
+          <a:p>
+            <a:r>
+              <a:rPr lang="en-US" dirty="0" smtClean="0"/>
+              <a:t>Most PGI don’t work as</a:t>
+            </a:r>
+            <a:r>
+              <a:rPr lang="en-US" dirty="0" smtClean="0"/>
+              <a:t> </a:t>
+            </a:r>
+            <a:r>
+              <a:rPr lang="en-US" dirty="0" smtClean="0"/>
+              <a:t>grid infrastructures!</a:t>
+            </a:r>
+          </a:p>
+          <a:p>
+            <a:pPr lvl="1"/>
+            <a:r>
+              <a:rPr lang="en-US" dirty="0" smtClean="0"/>
+              <a:t>Except </a:t>
+            </a:r>
+            <a:r>
+              <a:rPr lang="en-US" dirty="0" smtClean="0"/>
+              <a:t>for the</a:t>
+            </a:r>
+            <a:r>
+              <a:rPr lang="en-US" dirty="0" smtClean="0"/>
+              <a:t> elite few</a:t>
+            </a:r>
+            <a:r>
+              <a:rPr lang="en-US" dirty="0" smtClean="0"/>
+              <a:t> applications/projects</a:t>
+            </a:r>
             <a:endParaRPr lang="en-US" dirty="0" smtClean="0"/>
           </a:p>
           <a:p>
             <a:pPr lvl="1"/>
             <a:r>
               <a:rPr lang="en-US" dirty="0" smtClean="0"/>
-              <a:t>Mostly maturing</a:t>
-            </a:r>
-            <a:r>
-              <a:rPr lang="en-US" dirty="0" smtClean="0"/>
-              <a:t>, strengthening, seeing uptake</a:t>
-            </a:r>
-            <a:endParaRPr lang="en-US" dirty="0" smtClean="0"/>
-          </a:p>
-          <a:p>
-            <a:pPr lvl="2"/>
-            <a:r>
-              <a:rPr lang="en-US" dirty="0" smtClean="0"/>
-              <a:t>e.g., Many </a:t>
-            </a:r>
-            <a:r>
-              <a:rPr lang="en-US" dirty="0" smtClean="0"/>
-              <a:t>grid technologies are to be found in cloud space</a:t>
-            </a:r>
-            <a:endParaRPr lang="en-US" dirty="0" smtClean="0"/>
-          </a:p>
-          <a:p>
-            <a:pPr lvl="1"/>
-            <a:r>
-              <a:rPr lang="en-US" dirty="0" smtClean="0"/>
-              <a:t>Federation </a:t>
-            </a:r>
-            <a:r>
-              <a:rPr lang="en-US" dirty="0" smtClean="0"/>
-              <a:t>does not have to be difficult, but is</a:t>
-            </a:r>
-            <a:r>
-              <a:rPr lang="en-US" dirty="0" smtClean="0"/>
-              <a:t> due to tech &amp; policy</a:t>
-            </a:r>
-          </a:p>
-          <a:p>
-            <a:pPr lvl="2"/>
-            <a:r>
-              <a:rPr lang="en-US" dirty="0" smtClean="0"/>
-              <a:t>e.g</a:t>
-            </a:r>
-            <a:r>
-              <a:rPr lang="en-US" dirty="0" smtClean="0"/>
-              <a:t>., security, underlying policy behind security token</a:t>
-            </a:r>
-          </a:p>
-          <a:p>
-            <a:r>
-              <a:rPr lang="en-US" dirty="0" smtClean="0"/>
-              <a:t>Most </a:t>
-            </a:r>
-            <a:r>
-              <a:rPr lang="en-US" dirty="0" smtClean="0"/>
-              <a:t>PGI don’t work as GI, except for the determined/elite few</a:t>
-            </a:r>
-            <a:r>
-              <a:rPr lang="en-US" dirty="0" smtClean="0"/>
-              <a:t>! </a:t>
+              <a:t>Narrow</a:t>
             </a:r>
             <a:r>
               <a:rPr lang="en-US" dirty="0" smtClean="0"/>
               <a:t> </a:t>
             </a:r>
-          </a:p>
-          <a:p>
-            <a:pPr lvl="1"/>
-            <a:r>
-              <a:rPr lang="en-US" dirty="0" smtClean="0"/>
-              <a:t>Narrow Grids versus general-purpose grids </a:t>
+            <a:r>
+              <a:rPr lang="en-US" dirty="0" smtClean="0"/>
+              <a:t>grids </a:t>
+            </a:r>
+            <a:r>
+              <a:rPr lang="en-US" dirty="0" err="1" smtClean="0"/>
+              <a:t>vs</a:t>
+            </a:r>
+            <a:r>
+              <a:rPr lang="en-US" dirty="0" smtClean="0"/>
+              <a:t> </a:t>
+            </a:r>
+            <a:r>
+              <a:rPr lang="en-US" dirty="0" smtClean="0"/>
+              <a:t>general-purpose grids </a:t>
             </a:r>
             <a:r>
               <a:rPr lang="en-US" sz="1730" i="1" dirty="0" smtClean="0"/>
-              <a:t>[see Jha, </a:t>
+              <a:t>[Jha</a:t>
+            </a:r>
+            <a:r>
+              <a:rPr lang="en-US" sz="1730" i="1" dirty="0" smtClean="0"/>
+              <a:t>, </a:t>
             </a:r>
             <a:r>
               <a:rPr lang="en-US" sz="1730" i="1" dirty="0" err="1" smtClean="0"/>
@@ -6840,39 +6882,83 @@
             </a:r>
             <a:r>
               <a:rPr lang="en-US" sz="1730" i="1" dirty="0" smtClean="0"/>
-              <a:t>, Fox et al]</a:t>
-            </a:r>
-          </a:p>
-          <a:p>
-            <a:r>
-              <a:rPr lang="en-US" dirty="0" smtClean="0"/>
-              <a:t>Applications</a:t>
-            </a:r>
-            <a:r>
-              <a:rPr lang="en-US" dirty="0" smtClean="0"/>
-              <a:t>:</a:t>
-            </a:r>
+              <a:t>, </a:t>
+            </a:r>
+            <a:r>
+              <a:rPr lang="en-US" sz="1730" i="1" dirty="0" smtClean="0"/>
+              <a:t>Fox</a:t>
+            </a:r>
+            <a:r>
+              <a:rPr lang="en-US" sz="1730" i="1" dirty="0" smtClean="0"/>
+              <a:t>, CCPE’08</a:t>
+            </a:r>
+            <a:r>
+              <a:rPr lang="en-US" sz="1730" i="1" dirty="0" smtClean="0"/>
+              <a:t>]</a:t>
+            </a:r>
+            <a:endParaRPr lang="en-US" sz="1730" i="1" dirty="0" smtClean="0"/>
+          </a:p>
+          <a:p>
+            <a:r>
+              <a:rPr lang="en-US" dirty="0" smtClean="0"/>
+              <a:t>Applications:</a:t>
+            </a:r>
+            <a:endParaRPr lang="en-US" dirty="0" smtClean="0"/>
           </a:p>
           <a:p>
             <a:pPr lvl="1"/>
             <a:r>
               <a:rPr lang="en-US" dirty="0" smtClean="0"/>
-              <a:t>Abstractions for developing distributed applications missing</a:t>
-            </a:r>
+              <a:t>Develop </a:t>
+            </a:r>
+            <a:r>
+              <a:rPr lang="en-US" dirty="0" smtClean="0"/>
+              <a:t>distributed applications as localized </a:t>
+            </a:r>
+            <a:r>
+              <a:rPr lang="en-US" dirty="0" smtClean="0"/>
+              <a:t>applications, </a:t>
+            </a:r>
+            <a:r>
+              <a:rPr lang="en-US" dirty="0" smtClean="0"/>
+              <a:t>and then export to distributed environments a posteriori</a:t>
+            </a:r>
+          </a:p>
+          <a:p>
+            <a:pPr lvl="2"/>
+            <a:r>
+              <a:rPr lang="en-US" dirty="0" smtClean="0"/>
+              <a:t>Need</a:t>
+            </a:r>
+            <a:r>
+              <a:rPr lang="en-US" dirty="0" smtClean="0"/>
+              <a:t> to factor distribution and </a:t>
+            </a:r>
+            <a:r>
+              <a:rPr lang="en-US" dirty="0" smtClean="0"/>
+              <a:t>services</a:t>
+            </a:r>
+            <a:r>
+              <a:rPr lang="en-US" dirty="0" smtClean="0"/>
+              <a:t> </a:t>
+            </a:r>
+            <a:r>
+              <a:rPr lang="en-US" i="1" dirty="0" smtClean="0"/>
+              <a:t>a priori</a:t>
+            </a:r>
+            <a:endParaRPr lang="en-US" dirty="0" smtClean="0"/>
           </a:p>
           <a:p>
             <a:pPr lvl="1"/>
             <a:r>
               <a:rPr lang="en-US" dirty="0" smtClean="0"/>
-              <a:t>Still develop distributed applications as localized applications and then export to distributed environments a posteriori</a:t>
-            </a:r>
-          </a:p>
-          <a:p>
-            <a:pPr lvl="2"/>
-            <a:r>
-              <a:rPr lang="en-US" dirty="0" smtClean="0"/>
-              <a:t>Need first principles distribution or a priori distribution in mind</a:t>
-            </a:r>
+              <a:t>Abstractions for developing distributed applications </a:t>
+            </a:r>
+            <a:r>
+              <a:rPr lang="en-US" dirty="0" smtClean="0"/>
+              <a:t>missing</a:t>
+            </a:r>
+            <a:endParaRPr lang="en-US" dirty="0" smtClean="0"/>
           </a:p>
         </p:txBody>
       </p:sp>
@@ -6942,50 +7028,45 @@
           <a:lstStyle/>
           <a:p>
             <a:r>
-              <a:rPr lang="en-US" dirty="0" smtClean="0"/>
+              <a:rPr lang="en-US" i="1" dirty="0" smtClean="0"/>
               <a:t>Integrated end-to-end </a:t>
             </a:r>
             <a:r>
-              <a:rPr lang="en-US" dirty="0" smtClean="0"/>
-              <a:t>solutions</a:t>
-            </a:r>
-            <a:r>
-              <a:rPr lang="en-US" dirty="0" smtClean="0"/>
-              <a:t>: </a:t>
-            </a:r>
-            <a:r>
-              <a:rPr lang="en-US" dirty="0" smtClean="0"/>
-              <a:t>Applications </a:t>
-            </a:r>
-            <a:r>
-              <a:rPr lang="en-US" dirty="0" smtClean="0"/>
-              <a:t>down onwards to the lower reaches of middleware</a:t>
-            </a:r>
+              <a:rPr lang="en-US" i="1" dirty="0" smtClean="0"/>
+              <a:t>solutions for </a:t>
+            </a:r>
+            <a:r>
+              <a:rPr lang="en-US" i="1" dirty="0" smtClean="0"/>
+              <a:t>science &amp; engineering</a:t>
+            </a:r>
+          </a:p>
+          <a:p>
+            <a:r>
+              <a:rPr lang="en-US" dirty="0" smtClean="0"/>
+              <a:t>Low impedance between levels and across </a:t>
+            </a:r>
+            <a:r>
+              <a:rPr lang="en-US" dirty="0" smtClean="0"/>
+              <a:t>capabilities</a:t>
+            </a:r>
+            <a:endParaRPr lang="en-US" dirty="0" smtClean="0"/>
           </a:p>
           <a:p>
             <a:pPr lvl="1"/>
             <a:r>
               <a:rPr lang="en-US" dirty="0" smtClean="0"/>
-              <a:t>There exist many moving parts and degrees-of-freedom</a:t>
+              <a:t>There </a:t>
+            </a:r>
+            <a:r>
+              <a:rPr lang="en-US" dirty="0" smtClean="0"/>
+              <a:t>exist many moving parts and degrees-of-freedom</a:t>
             </a:r>
           </a:p>
           <a:p>
             <a:pPr lvl="2"/>
             <a:r>
               <a:rPr lang="en-US" dirty="0" smtClean="0"/>
-              <a:t>Individual components exist, but not integrated within</a:t>
-            </a:r>
-            <a:r>
-              <a:rPr lang="en-US" dirty="0" smtClean="0"/>
-              <a:t>  </a:t>
-            </a:r>
-            <a:r>
-              <a:rPr lang="en-US" dirty="0" smtClean="0"/>
-              <a:t>consistent </a:t>
-            </a:r>
-            <a:r>
-              <a:rPr lang="en-US" dirty="0" smtClean="0"/>
-              <a:t>architectures</a:t>
+              <a:t>Individual components exist, but not integrated within  consistent architectures</a:t>
             </a:r>
           </a:p>
           <a:p>
@@ -6994,35 +7075,46 @@
               <a:rPr lang="en-US" dirty="0" smtClean="0"/>
               <a:t>Multiple point-solutions but very few end-to-end solutions</a:t>
             </a:r>
+          </a:p>
+          <a:p>
+            <a:pPr lvl="1"/>
+            <a:r>
+              <a:rPr lang="en-US" dirty="0" smtClean="0"/>
+              <a:t>Most PGI effort: Individual software, not application capabilities</a:t>
+            </a:r>
+          </a:p>
+          <a:p>
+            <a:r>
+              <a:rPr lang="en-US" dirty="0" smtClean="0"/>
+              <a:t>Research Questions that are engendered?</a:t>
+            </a:r>
+          </a:p>
+          <a:p>
+            <a:pPr lvl="1"/>
+            <a:r>
+              <a:rPr lang="en-US" dirty="0" smtClean="0"/>
+              <a:t>How do we integrate</a:t>
+            </a:r>
+            <a:r>
+              <a:rPr lang="en-US" dirty="0" smtClean="0"/>
+              <a:t> software across </a:t>
+            </a:r>
+            <a:r>
+              <a:rPr lang="en-US" dirty="0" smtClean="0"/>
+              <a:t>levels</a:t>
+            </a:r>
+            <a:r>
+              <a:rPr lang="en-US" dirty="0" smtClean="0"/>
+              <a:t>?</a:t>
+            </a:r>
+          </a:p>
+          <a:p>
+            <a:pPr lvl="1"/>
+            <a:r>
+              <a:rPr lang="en-US" dirty="0" smtClean="0"/>
+              <a:t>How do we integrate capabilities? </a:t>
+            </a:r>
             <a:endParaRPr lang="en-US" dirty="0" smtClean="0"/>
-          </a:p>
-          <a:p>
-            <a:pPr lvl="1"/>
-            <a:r>
-              <a:rPr lang="en-US" dirty="0" smtClean="0"/>
-              <a:t>Most PGI effort: Individual software, not application </a:t>
-            </a:r>
-            <a:r>
-              <a:rPr lang="en-US" dirty="0" smtClean="0"/>
-              <a:t>capabilities</a:t>
-            </a:r>
-          </a:p>
-          <a:p>
-            <a:r>
-              <a:rPr lang="en-US" dirty="0" smtClean="0"/>
-              <a:t>Research Questions that are engendered?</a:t>
-            </a:r>
-          </a:p>
-          <a:p>
-            <a:pPr lvl="1"/>
-            <a:r>
-              <a:rPr lang="en-US" dirty="0" smtClean="0"/>
-              <a:t>How do we integrate disparate &amp; diverse </a:t>
-            </a:r>
-            <a:r>
-              <a:rPr lang="en-US" dirty="0" smtClean="0"/>
-              <a:t>software across levels?</a:t>
-            </a:r>
           </a:p>
           <a:p>
             <a:pPr lvl="1"/>
@@ -7091,21 +7183,40 @@
         <p:spPr/>
         <p:txBody>
           <a:bodyPr>
-            <a:normAutofit/>
+            <a:normAutofit fontScale="92500"/>
           </a:bodyPr>
           <a:lstStyle/>
           <a:p>
             <a:r>
               <a:rPr lang="en-US" dirty="0" smtClean="0"/>
-              <a:t>The need for broadly </a:t>
-            </a:r>
-            <a:r>
-              <a:rPr lang="en-US" dirty="0" smtClean="0"/>
-              <a:t>and</a:t>
-            </a:r>
-            <a:r>
-              <a:rPr lang="en-US" dirty="0" smtClean="0"/>
-              <a:t> deeply Integrated capabilities</a:t>
+              <a:t>Context </a:t>
+            </a:r>
+            <a:r>
+              <a:rPr lang="en-US" smtClean="0"/>
+              <a:t>set by </a:t>
+            </a:r>
+            <a:r>
+              <a:rPr lang="en-US" dirty="0" smtClean="0"/>
+              <a:t>open </a:t>
+            </a:r>
+            <a:r>
+              <a:rPr lang="en-US" smtClean="0"/>
+              <a:t>challenge: </a:t>
+            </a:r>
+            <a:r>
+              <a:rPr lang="en-US" i="1" smtClean="0"/>
+              <a:t>Integrated end-to-end solution</a:t>
+            </a:r>
+            <a:endParaRPr lang="en-US" smtClean="0"/>
+          </a:p>
+          <a:p>
+            <a:r>
+              <a:rPr lang="en-US" dirty="0" smtClean="0"/>
+              <a:t>The </a:t>
+            </a:r>
+            <a:r>
+              <a:rPr lang="en-US" dirty="0" smtClean="0"/>
+              <a:t>need for broadly and deeply Integrated capabilities</a:t>
             </a:r>
           </a:p>
           <a:p>
@@ -7119,15 +7230,23 @@
             <a:pPr lvl="2"/>
             <a:r>
               <a:rPr lang="en-US" dirty="0" smtClean="0"/>
-              <a:t>Integrated end-to-end solutio</a:t>
-            </a:r>
-            <a:r>
-              <a:rPr lang="en-US" dirty="0" smtClean="0"/>
-              <a:t>n</a:t>
-            </a:r>
-            <a:r>
-              <a:rPr lang="en-US" dirty="0" smtClean="0"/>
-              <a:t> for applications requires transparent federation of  capabilities and the interoperability of services</a:t>
+              <a:t>Integrated end-to-end </a:t>
+            </a:r>
+            <a:r>
+              <a:rPr lang="en-US" dirty="0" smtClean="0"/>
+              <a:t>solutions </a:t>
+            </a:r>
+            <a:r>
+              <a:rPr lang="en-US" dirty="0" smtClean="0"/>
+              <a:t>for applications </a:t>
+            </a:r>
+            <a:r>
+              <a:rPr lang="en-US" dirty="0" smtClean="0"/>
+              <a:t>require </a:t>
+            </a:r>
+            <a:r>
+              <a:rPr lang="en-US" dirty="0" smtClean="0"/>
+              <a:t>transparent federation of  capabilities and the interoperability of services</a:t>
             </a:r>
           </a:p>
           <a:p>
@@ -7142,15 +7261,28 @@
             <a:pPr lvl="2"/>
             <a:r>
               <a:rPr lang="en-US" dirty="0" smtClean="0"/>
-              <a:t>Lower-level Integration between middleware and hardware</a:t>
+              <a:t>Upper</a:t>
+            </a:r>
+            <a:r>
+              <a:rPr lang="en-US" dirty="0" smtClean="0"/>
+              <a:t>-level integration between application and </a:t>
+            </a:r>
+            <a:r>
+              <a:rPr lang="en-US" dirty="0" smtClean="0"/>
+              <a:t>middleware</a:t>
             </a:r>
           </a:p>
           <a:p>
             <a:pPr lvl="2"/>
             <a:r>
               <a:rPr lang="en-US" dirty="0" smtClean="0"/>
-              <a:t>Upper-level integration between application and middleware</a:t>
-            </a:r>
+              <a:t>Lower-level Integration between middleware and </a:t>
+            </a:r>
+            <a:r>
+              <a:rPr lang="en-US" dirty="0" smtClean="0"/>
+              <a:t>hardware</a:t>
+            </a:r>
+            <a:endParaRPr lang="en-US" dirty="0" smtClean="0"/>
           </a:p>
           <a:p>
             <a:r>
@@ -7162,16 +7294,29 @@
             <a:pPr lvl="1"/>
             <a:r>
               <a:rPr lang="en-US" dirty="0" smtClean="0"/>
-              <a:t>Test-beds exist out there but need to support</a:t>
-            </a:r>
-            <a:r>
-              <a:rPr lang="en-US" dirty="0" smtClean="0"/>
-              <a:t> end-to-end effort </a:t>
-            </a:r>
-            <a:r>
-              <a:rPr lang="en-US" dirty="0" smtClean="0"/>
-              <a:t>to use test-beds to transition from experimental to production-grade. </a:t>
-            </a:r>
+              <a:t>Test-beds </a:t>
+            </a:r>
+            <a:r>
+              <a:rPr lang="en-US" dirty="0" smtClean="0"/>
+              <a:t>exist, </a:t>
+            </a:r>
+            <a:r>
+              <a:rPr lang="en-US" dirty="0" smtClean="0"/>
+              <a:t>but need to support end-to-end effort to use</a:t>
+            </a:r>
+            <a:r>
+              <a:rPr lang="en-US" dirty="0" smtClean="0"/>
+              <a:t> them to </a:t>
+            </a:r>
+            <a:r>
+              <a:rPr lang="en-US" dirty="0" smtClean="0"/>
+              <a:t>transition from experimental to production-</a:t>
+            </a:r>
+            <a:r>
+              <a:rPr lang="en-US" dirty="0" smtClean="0"/>
+              <a:t>grade  </a:t>
+            </a:r>
+            <a:endParaRPr lang="en-US" dirty="0" smtClean="0"/>
           </a:p>
           <a:p>
             <a:pPr lvl="1"/>

</xml_diff>

<commit_message>
Added slides from yesterday's Colloquium at Center for Computational and Integrative Biology
git-svn-id: file://localhost/tmp/svn2git/svn@5662 defb5e50-622e-49ec-a68e-d72c7db87b45
</commit_message>
<xml_diff>
--- a/saga-talks/saga-magic.pptx
+++ b/saga-talks/saga-magic.pptx
@@ -198,7 +198,7 @@
             <a:fld id="{8E161E8F-4E15-A840-9658-105F9DD3DE22}" type="datetimeFigureOut">
               <a:rPr lang="en-US" smtClean="0"/>
               <a:pPr/>
-              <a:t>7/4/11</a:t>
+              <a:t>7/6/11</a:t>
             </a:fld>
             <a:endParaRPr lang="en-US"/>
           </a:p>
@@ -794,7 +794,7 @@
             <a:fld id="{4C4AD4EB-88D0-C141-9474-CCD86A78CB94}" type="datetimeFigureOut">
               <a:rPr lang="en-US" smtClean="0"/>
               <a:pPr/>
-              <a:t>7/4/11</a:t>
+              <a:t>7/6/11</a:t>
             </a:fld>
             <a:endParaRPr lang="en-US" dirty="0"/>
           </a:p>
@@ -1117,7 +1117,7 @@
             <a:fld id="{4C4AD4EB-88D0-C141-9474-CCD86A78CB94}" type="datetimeFigureOut">
               <a:rPr lang="en-US" smtClean="0"/>
               <a:pPr/>
-              <a:t>7/4/11</a:t>
+              <a:t>7/6/11</a:t>
             </a:fld>
             <a:endParaRPr lang="en-US"/>
           </a:p>
@@ -1393,7 +1393,7 @@
             <a:fld id="{4C4AD4EB-88D0-C141-9474-CCD86A78CB94}" type="datetimeFigureOut">
               <a:rPr lang="en-US" smtClean="0"/>
               <a:pPr/>
-              <a:t>7/4/11</a:t>
+              <a:t>7/6/11</a:t>
             </a:fld>
             <a:endParaRPr lang="en-US"/>
           </a:p>
@@ -1685,7 +1685,7 @@
             <a:fld id="{4C4AD4EB-88D0-C141-9474-CCD86A78CB94}" type="datetimeFigureOut">
               <a:rPr lang="en-US" smtClean="0"/>
               <a:pPr/>
-              <a:t>7/4/11</a:t>
+              <a:t>7/6/11</a:t>
             </a:fld>
             <a:endParaRPr lang="en-US"/>
           </a:p>
@@ -2012,7 +2012,7 @@
             <a:fld id="{4C4AD4EB-88D0-C141-9474-CCD86A78CB94}" type="datetimeFigureOut">
               <a:rPr lang="en-US" smtClean="0"/>
               <a:pPr/>
-              <a:t>7/4/11</a:t>
+              <a:t>7/6/11</a:t>
             </a:fld>
             <a:endParaRPr lang="en-US"/>
           </a:p>
@@ -2260,7 +2260,7 @@
             <a:fld id="{4C4AD4EB-88D0-C141-9474-CCD86A78CB94}" type="datetimeFigureOut">
               <a:rPr lang="en-US" smtClean="0"/>
               <a:pPr/>
-              <a:t>7/4/11</a:t>
+              <a:t>7/6/11</a:t>
             </a:fld>
             <a:endParaRPr lang="en-US"/>
           </a:p>
@@ -2437,7 +2437,7 @@
             <a:fld id="{4C4AD4EB-88D0-C141-9474-CCD86A78CB94}" type="datetimeFigureOut">
               <a:rPr lang="en-US" smtClean="0"/>
               <a:pPr/>
-              <a:t>7/4/11</a:t>
+              <a:t>7/6/11</a:t>
             </a:fld>
             <a:endParaRPr lang="en-US"/>
           </a:p>
@@ -2814,7 +2814,7 @@
             <a:fld id="{4C4AD4EB-88D0-C141-9474-CCD86A78CB94}" type="datetimeFigureOut">
               <a:rPr lang="en-US" smtClean="0"/>
               <a:pPr/>
-              <a:t>7/4/11</a:t>
+              <a:t>7/6/11</a:t>
             </a:fld>
             <a:endParaRPr lang="en-US"/>
           </a:p>
@@ -3085,7 +3085,7 @@
             <a:fld id="{4C4AD4EB-88D0-C141-9474-CCD86A78CB94}" type="datetimeFigureOut">
               <a:rPr lang="en-US" smtClean="0"/>
               <a:pPr/>
-              <a:t>7/4/11</a:t>
+              <a:t>7/6/11</a:t>
             </a:fld>
             <a:endParaRPr lang="en-US"/>
           </a:p>
@@ -3393,7 +3393,7 @@
             <a:fld id="{4C4AD4EB-88D0-C141-9474-CCD86A78CB94}" type="datetimeFigureOut">
               <a:rPr lang="en-US" smtClean="0"/>
               <a:pPr/>
-              <a:t>7/4/11</a:t>
+              <a:t>7/6/11</a:t>
             </a:fld>
             <a:endParaRPr lang="en-US"/>
           </a:p>
@@ -3687,7 +3687,7 @@
             <a:fld id="{4C4AD4EB-88D0-C141-9474-CCD86A78CB94}" type="datetimeFigureOut">
               <a:rPr lang="en-US" smtClean="0"/>
               <a:pPr/>
-              <a:t>7/4/11</a:t>
+              <a:t>7/6/11</a:t>
             </a:fld>
             <a:endParaRPr lang="en-US"/>
           </a:p>
@@ -4119,7 +4119,7 @@
             <a:fld id="{4C4AD4EB-88D0-C141-9474-CCD86A78CB94}" type="datetimeFigureOut">
               <a:rPr lang="en-US" smtClean="0"/>
               <a:pPr/>
-              <a:t>7/4/11</a:t>
+              <a:t>7/6/11</a:t>
             </a:fld>
             <a:endParaRPr lang="en-US"/>
           </a:p>
@@ -4467,7 +4467,7 @@
             <a:fld id="{4C4AD4EB-88D0-C141-9474-CCD86A78CB94}" type="datetimeFigureOut">
               <a:rPr lang="en-US" smtClean="0"/>
               <a:pPr/>
-              <a:t>7/4/11</a:t>
+              <a:t>7/6/11</a:t>
             </a:fld>
             <a:endParaRPr lang="en-US"/>
           </a:p>
@@ -4559,7 +4559,7 @@
             <a:fld id="{4C4AD4EB-88D0-C141-9474-CCD86A78CB94}" type="datetimeFigureOut">
               <a:rPr lang="en-US" smtClean="0"/>
               <a:pPr/>
-              <a:t>7/4/11</a:t>
+              <a:t>7/6/11</a:t>
             </a:fld>
             <a:endParaRPr lang="en-US"/>
           </a:p>
@@ -4898,7 +4898,7 @@
             <a:fld id="{4C4AD4EB-88D0-C141-9474-CCD86A78CB94}" type="datetimeFigureOut">
               <a:rPr lang="en-US" smtClean="0"/>
               <a:pPr/>
-              <a:t>7/4/11</a:t>
+              <a:t>7/6/11</a:t>
             </a:fld>
             <a:endParaRPr lang="en-US"/>
           </a:p>
@@ -5112,7 +5112,7 @@
             <a:fld id="{4C4AD4EB-88D0-C141-9474-CCD86A78CB94}" type="datetimeFigureOut">
               <a:rPr lang="en-US" smtClean="0"/>
               <a:pPr/>
-              <a:t>7/4/11</a:t>
+              <a:t>7/6/11</a:t>
             </a:fld>
             <a:endParaRPr lang="en-US"/>
           </a:p>
@@ -5794,7 +5794,7 @@
             <a:fld id="{9CA5C856-D373-2E49-9257-F90004C68B8A}" type="datetimeFigureOut">
               <a:rPr lang="en-US" smtClean="0"/>
               <a:pPr/>
-              <a:t>7/4/11</a:t>
+              <a:t>7/6/11</a:t>
             </a:fld>
             <a:endParaRPr lang="en-US" dirty="0"/>
           </a:p>
@@ -6326,11 +6326,7 @@
             </a:r>
             <a:r>
               <a:rPr lang="en-US" dirty="0" smtClean="0"/>
-              <a:t>,</a:t>
-            </a:r>
-            <a:r>
-              <a:rPr lang="en-US" dirty="0" smtClean="0"/>
-              <a:t>  M </a:t>
+              <a:t>,  M </a:t>
             </a:r>
             <a:r>
               <a:rPr lang="en-US" dirty="0" err="1" smtClean="0"/>
@@ -6353,15 +6349,7 @@
                   <a:srgbClr val="800000"/>
                 </a:solidFill>
               </a:rPr>
-              <a:t>http</a:t>
-            </a:r>
-            <a:r>
-              <a:rPr lang="en-US" sz="2100" dirty="0" smtClean="0">
-                <a:solidFill>
-                  <a:srgbClr val="800000"/>
-                </a:solidFill>
-              </a:rPr>
-              <a:t>://</a:t>
+              <a:t>http://</a:t>
             </a:r>
             <a:r>
               <a:rPr lang="en-US" sz="2100" dirty="0" err="1" smtClean="0">
@@ -6755,23 +6743,7 @@
           <a:p>
             <a:r>
               <a:rPr lang="en-US" dirty="0" smtClean="0"/>
-              <a:t>Separate grid </a:t>
-            </a:r>
-            <a:r>
-              <a:rPr lang="en-US" dirty="0" smtClean="0"/>
-              <a:t>technologies, from </a:t>
-            </a:r>
-            <a:r>
-              <a:rPr lang="en-US" dirty="0" smtClean="0"/>
-              <a:t>production grid infrastructure (PGI</a:t>
-            </a:r>
-            <a:r>
-              <a:rPr lang="en-US" dirty="0" smtClean="0"/>
-              <a:t>), from </a:t>
-            </a:r>
-            <a:r>
-              <a:rPr lang="en-US" dirty="0" smtClean="0"/>
-              <a:t>grid/distributed applications</a:t>
+              <a:t>Separate grid technologies, from production grid infrastructure (PGI), from grid/distributed applications</a:t>
             </a:r>
           </a:p>
           <a:p>
@@ -6811,50 +6783,21 @@
           <a:p>
             <a:r>
               <a:rPr lang="en-US" dirty="0" smtClean="0"/>
-              <a:t>Most PGI don’t work as</a:t>
-            </a:r>
+              <a:t>Most PGI don’t work as grid infrastructures!</a:t>
+            </a:r>
+          </a:p>
+          <a:p>
+            <a:pPr lvl="1"/>
             <a:r>
               <a:rPr lang="en-US" dirty="0" smtClean="0"/>
-              <a:t> </a:t>
-            </a:r>
+              <a:t>Except for the elite few applications/projects</a:t>
+            </a:r>
+          </a:p>
+          <a:p>
+            <a:pPr lvl="1"/>
             <a:r>
               <a:rPr lang="en-US" dirty="0" smtClean="0"/>
-              <a:t>grid infrastructures!</a:t>
-            </a:r>
-          </a:p>
-          <a:p>
-            <a:pPr lvl="1"/>
-            <a:r>
-              <a:rPr lang="en-US" dirty="0" smtClean="0"/>
-              <a:t>Except </a:t>
-            </a:r>
-            <a:r>
-              <a:rPr lang="en-US" dirty="0" smtClean="0"/>
-              <a:t>for the</a:t>
-            </a:r>
-            <a:r>
-              <a:rPr lang="en-US" dirty="0" smtClean="0"/>
-              <a:t> elite few</a:t>
-            </a:r>
-            <a:r>
-              <a:rPr lang="en-US" dirty="0" smtClean="0"/>
-              <a:t> applications/projects</a:t>
-            </a:r>
-            <a:endParaRPr lang="en-US" dirty="0" smtClean="0"/>
-          </a:p>
-          <a:p>
-            <a:pPr lvl="1"/>
-            <a:r>
-              <a:rPr lang="en-US" dirty="0" smtClean="0"/>
-              <a:t>Narrow</a:t>
-            </a:r>
-            <a:r>
-              <a:rPr lang="en-US" dirty="0" smtClean="0"/>
-              <a:t> </a:t>
-            </a:r>
-            <a:r>
-              <a:rPr lang="en-US" dirty="0" smtClean="0"/>
-              <a:t>grids </a:t>
+              <a:t>Narrow grids </a:t>
             </a:r>
             <a:r>
               <a:rPr lang="en-US" dirty="0" err="1" smtClean="0"/>
@@ -6862,19 +6805,11 @@
             </a:r>
             <a:r>
               <a:rPr lang="en-US" dirty="0" smtClean="0"/>
-              <a:t> </a:t>
-            </a:r>
-            <a:r>
-              <a:rPr lang="en-US" dirty="0" smtClean="0"/>
-              <a:t>general-purpose grids </a:t>
+              <a:t> general-purpose grids </a:t>
             </a:r>
             <a:r>
               <a:rPr lang="en-US" sz="1730" i="1" dirty="0" smtClean="0"/>
-              <a:t>[Jha</a:t>
-            </a:r>
-            <a:r>
-              <a:rPr lang="en-US" sz="1730" i="1" dirty="0" smtClean="0"/>
-              <a:t>, </a:t>
+              <a:t>[Jha, </a:t>
             </a:r>
             <a:r>
               <a:rPr lang="en-US" sz="1730" i="1" dirty="0" err="1" smtClean="0"/>
@@ -6882,65 +6817,27 @@
             </a:r>
             <a:r>
               <a:rPr lang="en-US" sz="1730" i="1" dirty="0" smtClean="0"/>
-              <a:t>, </a:t>
-            </a:r>
-            <a:r>
-              <a:rPr lang="en-US" sz="1730" i="1" dirty="0" smtClean="0"/>
-              <a:t>Fox</a:t>
-            </a:r>
-            <a:r>
-              <a:rPr lang="en-US" sz="1730" i="1" dirty="0" smtClean="0"/>
-              <a:t>, CCPE’08</a:t>
-            </a:r>
-            <a:r>
-              <a:rPr lang="en-US" sz="1730" i="1" dirty="0" smtClean="0"/>
-              <a:t>]</a:t>
-            </a:r>
-            <a:endParaRPr lang="en-US" sz="1730" i="1" dirty="0" smtClean="0"/>
+              <a:t>, Fox, CCPE’08]</a:t>
+            </a:r>
           </a:p>
           <a:p>
             <a:r>
               <a:rPr lang="en-US" dirty="0" smtClean="0"/>
               <a:t>Applications:</a:t>
             </a:r>
-            <a:endParaRPr lang="en-US" dirty="0" smtClean="0"/>
           </a:p>
           <a:p>
             <a:pPr lvl="1"/>
             <a:r>
               <a:rPr lang="en-US" dirty="0" smtClean="0"/>
-              <a:t>Develop </a:t>
-            </a:r>
+              <a:t>Develop distributed applications as localized applications, and then export to distributed environments a posteriori</a:t>
+            </a:r>
+          </a:p>
+          <a:p>
+            <a:pPr lvl="2"/>
             <a:r>
               <a:rPr lang="en-US" dirty="0" smtClean="0"/>
-              <a:t>distributed applications as localized </a:t>
-            </a:r>
-            <a:r>
-              <a:rPr lang="en-US" dirty="0" smtClean="0"/>
-              <a:t>applications, </a:t>
-            </a:r>
-            <a:r>
-              <a:rPr lang="en-US" dirty="0" smtClean="0"/>
-              <a:t>and then export to distributed environments a posteriori</a:t>
-            </a:r>
-          </a:p>
-          <a:p>
-            <a:pPr lvl="2"/>
-            <a:r>
-              <a:rPr lang="en-US" dirty="0" smtClean="0"/>
-              <a:t>Need</a:t>
-            </a:r>
-            <a:r>
-              <a:rPr lang="en-US" dirty="0" smtClean="0"/>
-              <a:t> to factor distribution and </a:t>
-            </a:r>
-            <a:r>
-              <a:rPr lang="en-US" dirty="0" smtClean="0"/>
-              <a:t>services</a:t>
-            </a:r>
-            <a:r>
-              <a:rPr lang="en-US" dirty="0" smtClean="0"/>
-              <a:t> </a:t>
+              <a:t>Need to factor distribution and services </a:t>
             </a:r>
             <a:r>
               <a:rPr lang="en-US" i="1" dirty="0" smtClean="0"/>
@@ -6952,13 +6849,8 @@
             <a:pPr lvl="1"/>
             <a:r>
               <a:rPr lang="en-US" dirty="0" smtClean="0"/>
-              <a:t>Abstractions for developing distributed applications </a:t>
-            </a:r>
-            <a:r>
-              <a:rPr lang="en-US" dirty="0" smtClean="0"/>
-              <a:t>missing</a:t>
-            </a:r>
-            <a:endParaRPr lang="en-US" dirty="0" smtClean="0"/>
+              <a:t>Abstractions for developing distributed applications missing</a:t>
+            </a:r>
           </a:p>
         </p:txBody>
       </p:sp>
@@ -7029,37 +6921,20 @@
           <a:p>
             <a:r>
               <a:rPr lang="en-US" i="1" dirty="0" smtClean="0"/>
-              <a:t>Integrated end-to-end </a:t>
-            </a:r>
-            <a:r>
-              <a:rPr lang="en-US" i="1" dirty="0" smtClean="0"/>
-              <a:t>solutions for </a:t>
-            </a:r>
-            <a:r>
-              <a:rPr lang="en-US" i="1" dirty="0" smtClean="0"/>
-              <a:t>science &amp; engineering</a:t>
+              <a:t>Integrated end-to-end solutions for science &amp; engineering</a:t>
             </a:r>
           </a:p>
           <a:p>
             <a:r>
               <a:rPr lang="en-US" dirty="0" smtClean="0"/>
-              <a:t>Low impedance between levels and across </a:t>
-            </a:r>
+              <a:t>Low impedance between levels and across capabilities</a:t>
+            </a:r>
+          </a:p>
+          <a:p>
+            <a:pPr lvl="1"/>
             <a:r>
               <a:rPr lang="en-US" dirty="0" smtClean="0"/>
-              <a:t>capabilities</a:t>
-            </a:r>
-            <a:endParaRPr lang="en-US" dirty="0" smtClean="0"/>
-          </a:p>
-          <a:p>
-            <a:pPr lvl="1"/>
-            <a:r>
-              <a:rPr lang="en-US" dirty="0" smtClean="0"/>
-              <a:t>There </a:t>
-            </a:r>
-            <a:r>
-              <a:rPr lang="en-US" dirty="0" smtClean="0"/>
-              <a:t>exist many moving parts and degrees-of-freedom</a:t>
+              <a:t>There exist many moving parts and degrees-of-freedom</a:t>
             </a:r>
           </a:p>
           <a:p>
@@ -7093,19 +6968,7 @@
             <a:pPr lvl="1"/>
             <a:r>
               <a:rPr lang="en-US" dirty="0" smtClean="0"/>
-              <a:t>How do we integrate</a:t>
-            </a:r>
-            <a:r>
-              <a:rPr lang="en-US" dirty="0" smtClean="0"/>
-              <a:t> software across </a:t>
-            </a:r>
-            <a:r>
-              <a:rPr lang="en-US" dirty="0" smtClean="0"/>
-              <a:t>levels</a:t>
-            </a:r>
-            <a:r>
-              <a:rPr lang="en-US" dirty="0" smtClean="0"/>
-              <a:t>?</a:t>
+              <a:t>How do we integrate software across levels?</a:t>
             </a:r>
           </a:p>
           <a:p>
@@ -7114,7 +6977,6 @@
               <a:rPr lang="en-US" dirty="0" smtClean="0"/>
               <a:t>How do we integrate capabilities? </a:t>
             </a:r>
-            <a:endParaRPr lang="en-US" dirty="0" smtClean="0"/>
           </a:p>
           <a:p>
             <a:pPr lvl="1"/>
@@ -7212,11 +7074,7 @@
           <a:p>
             <a:r>
               <a:rPr lang="en-US" dirty="0" smtClean="0"/>
-              <a:t>The </a:t>
-            </a:r>
-            <a:r>
-              <a:rPr lang="en-US" dirty="0" smtClean="0"/>
-              <a:t>need for broadly and deeply Integrated capabilities</a:t>
+              <a:t>The need for broadly and deeply Integrated capabilities</a:t>
             </a:r>
           </a:p>
           <a:p>
@@ -7230,23 +7088,7 @@
             <a:pPr lvl="2"/>
             <a:r>
               <a:rPr lang="en-US" dirty="0" smtClean="0"/>
-              <a:t>Integrated end-to-end </a:t>
-            </a:r>
-            <a:r>
-              <a:rPr lang="en-US" dirty="0" smtClean="0"/>
-              <a:t>solutions </a:t>
-            </a:r>
-            <a:r>
-              <a:rPr lang="en-US" dirty="0" smtClean="0"/>
-              <a:t>for applications </a:t>
-            </a:r>
-            <a:r>
-              <a:rPr lang="en-US" dirty="0" smtClean="0"/>
-              <a:t>require </a:t>
-            </a:r>
-            <a:r>
-              <a:rPr lang="en-US" dirty="0" smtClean="0"/>
-              <a:t>transparent federation of  capabilities and the interoperability of services</a:t>
+              <a:t>Integrated end-to-end solutions for applications require transparent federation of  capabilities and the interoperability of services</a:t>
             </a:r>
           </a:p>
           <a:p>
@@ -7255,34 +7097,20 @@
               <a:rPr lang="en-US" dirty="0" smtClean="0"/>
               <a:t>Deeply Integrated:</a:t>
             </a:r>
-            <a:endParaRPr lang="en-US" dirty="0" smtClean="0"/>
           </a:p>
           <a:p>
             <a:pPr lvl="2"/>
             <a:r>
               <a:rPr lang="en-US" dirty="0" smtClean="0"/>
-              <a:t>Upper</a:t>
-            </a:r>
+              <a:t>Upper-level integration between application and middleware</a:t>
+            </a:r>
+          </a:p>
+          <a:p>
+            <a:pPr lvl="2"/>
             <a:r>
               <a:rPr lang="en-US" dirty="0" smtClean="0"/>
-              <a:t>-level integration between application and </a:t>
-            </a:r>
-            <a:r>
-              <a:rPr lang="en-US" dirty="0" smtClean="0"/>
-              <a:t>middleware</a:t>
-            </a:r>
-          </a:p>
-          <a:p>
-            <a:pPr lvl="2"/>
-            <a:r>
-              <a:rPr lang="en-US" dirty="0" smtClean="0"/>
-              <a:t>Lower-level Integration between middleware and </a:t>
-            </a:r>
-            <a:r>
-              <a:rPr lang="en-US" dirty="0" smtClean="0"/>
-              <a:t>hardware</a:t>
-            </a:r>
-            <a:endParaRPr lang="en-US" dirty="0" smtClean="0"/>
+              <a:t>Lower-level Integration between middleware and hardware</a:t>
+            </a:r>
           </a:p>
           <a:p>
             <a:r>
@@ -7294,29 +7122,8 @@
             <a:pPr lvl="1"/>
             <a:r>
               <a:rPr lang="en-US" dirty="0" smtClean="0"/>
-              <a:t>Test-beds </a:t>
-            </a:r>
-            <a:r>
-              <a:rPr lang="en-US" dirty="0" smtClean="0"/>
-              <a:t>exist, </a:t>
-            </a:r>
-            <a:r>
-              <a:rPr lang="en-US" dirty="0" smtClean="0"/>
-              <a:t>but need to support end-to-end effort to use</a:t>
-            </a:r>
-            <a:r>
-              <a:rPr lang="en-US" dirty="0" smtClean="0"/>
-              <a:t> them to </a:t>
-            </a:r>
-            <a:r>
-              <a:rPr lang="en-US" dirty="0" smtClean="0"/>
-              <a:t>transition from experimental to production-</a:t>
-            </a:r>
-            <a:r>
-              <a:rPr lang="en-US" dirty="0" smtClean="0"/>
-              <a:t>grade  </a:t>
-            </a:r>
-            <a:endParaRPr lang="en-US" dirty="0" smtClean="0"/>
+              <a:t>Test-beds exist, but need to support end-to-end effort to use them to transition from experimental to production-grade  </a:t>
+            </a:r>
           </a:p>
           <a:p>
             <a:pPr lvl="1"/>

</xml_diff>